<commit_message>
Dev guide undo redo updated
</commit_message>
<xml_diff>
--- a/docs/diagrams/UndoRedoExecuteUndoStateListDiagram.pptx
+++ b/docs/diagrams/UndoRedoExecuteUndoStateListDiagram.pptx
@@ -112,10 +112,6 @@
 </p:presentation>
 </file>
 
-<file path=ppt/revisionInfo.xml><?xml version="1.0" encoding="utf-8"?>
-<p1510:revInfo xmlns:a="http://schemas.openxmlformats.org/drawingml/2006/main" xmlns:r="http://schemas.openxmlformats.org/officeDocument/2006/relationships" xmlns:p1510="http://schemas.microsoft.com/office/powerpoint/2015/10/main"/>
-</file>
-
 <file path=ppt/slideLayouts/slideLayout1.xml><?xml version="1.0" encoding="utf-8"?>
 <p:sldLayout xmlns:a="http://schemas.openxmlformats.org/drawingml/2006/main" xmlns:r="http://schemas.openxmlformats.org/officeDocument/2006/relationships" xmlns:p="http://schemas.openxmlformats.org/presentationml/2006/main" type="title" preserve="1">
   <p:cSld name="Title Slide">
@@ -265,7 +261,7 @@
           <a:p>
             <a:fld id="{03EC4E3E-8101-482F-A883-8B55DAFF7C07}" type="datetimeFigureOut">
               <a:rPr lang="en-SG" smtClean="0"/>
-              <a:t>6/7/2018</a:t>
+              <a:t>12/11/18</a:t>
             </a:fld>
             <a:endParaRPr lang="en-SG"/>
           </a:p>
@@ -465,7 +461,7 @@
           <a:p>
             <a:fld id="{03EC4E3E-8101-482F-A883-8B55DAFF7C07}" type="datetimeFigureOut">
               <a:rPr lang="en-SG" smtClean="0"/>
-              <a:t>6/7/2018</a:t>
+              <a:t>12/11/18</a:t>
             </a:fld>
             <a:endParaRPr lang="en-SG"/>
           </a:p>
@@ -675,7 +671,7 @@
           <a:p>
             <a:fld id="{03EC4E3E-8101-482F-A883-8B55DAFF7C07}" type="datetimeFigureOut">
               <a:rPr lang="en-SG" smtClean="0"/>
-              <a:t>6/7/2018</a:t>
+              <a:t>12/11/18</a:t>
             </a:fld>
             <a:endParaRPr lang="en-SG"/>
           </a:p>
@@ -875,7 +871,7 @@
           <a:p>
             <a:fld id="{03EC4E3E-8101-482F-A883-8B55DAFF7C07}" type="datetimeFigureOut">
               <a:rPr lang="en-SG" smtClean="0"/>
-              <a:t>6/7/2018</a:t>
+              <a:t>12/11/18</a:t>
             </a:fld>
             <a:endParaRPr lang="en-SG"/>
           </a:p>
@@ -1151,7 +1147,7 @@
           <a:p>
             <a:fld id="{03EC4E3E-8101-482F-A883-8B55DAFF7C07}" type="datetimeFigureOut">
               <a:rPr lang="en-SG" smtClean="0"/>
-              <a:t>6/7/2018</a:t>
+              <a:t>12/11/18</a:t>
             </a:fld>
             <a:endParaRPr lang="en-SG"/>
           </a:p>
@@ -1419,7 +1415,7 @@
           <a:p>
             <a:fld id="{03EC4E3E-8101-482F-A883-8B55DAFF7C07}" type="datetimeFigureOut">
               <a:rPr lang="en-SG" smtClean="0"/>
-              <a:t>6/7/2018</a:t>
+              <a:t>12/11/18</a:t>
             </a:fld>
             <a:endParaRPr lang="en-SG"/>
           </a:p>
@@ -1834,7 +1830,7 @@
           <a:p>
             <a:fld id="{03EC4E3E-8101-482F-A883-8B55DAFF7C07}" type="datetimeFigureOut">
               <a:rPr lang="en-SG" smtClean="0"/>
-              <a:t>6/7/2018</a:t>
+              <a:t>12/11/18</a:t>
             </a:fld>
             <a:endParaRPr lang="en-SG"/>
           </a:p>
@@ -1976,7 +1972,7 @@
           <a:p>
             <a:fld id="{03EC4E3E-8101-482F-A883-8B55DAFF7C07}" type="datetimeFigureOut">
               <a:rPr lang="en-SG" smtClean="0"/>
-              <a:t>6/7/2018</a:t>
+              <a:t>12/11/18</a:t>
             </a:fld>
             <a:endParaRPr lang="en-SG"/>
           </a:p>
@@ -2089,7 +2085,7 @@
           <a:p>
             <a:fld id="{03EC4E3E-8101-482F-A883-8B55DAFF7C07}" type="datetimeFigureOut">
               <a:rPr lang="en-SG" smtClean="0"/>
-              <a:t>6/7/2018</a:t>
+              <a:t>12/11/18</a:t>
             </a:fld>
             <a:endParaRPr lang="en-SG"/>
           </a:p>
@@ -2402,7 +2398,7 @@
           <a:p>
             <a:fld id="{03EC4E3E-8101-482F-A883-8B55DAFF7C07}" type="datetimeFigureOut">
               <a:rPr lang="en-SG" smtClean="0"/>
-              <a:t>6/7/2018</a:t>
+              <a:t>12/11/18</a:t>
             </a:fld>
             <a:endParaRPr lang="en-SG"/>
           </a:p>
@@ -2691,7 +2687,7 @@
           <a:p>
             <a:fld id="{03EC4E3E-8101-482F-A883-8B55DAFF7C07}" type="datetimeFigureOut">
               <a:rPr lang="en-SG" smtClean="0"/>
-              <a:t>6/7/2018</a:t>
+              <a:t>12/11/18</a:t>
             </a:fld>
             <a:endParaRPr lang="en-SG"/>
           </a:p>
@@ -2934,7 +2930,7 @@
           <a:p>
             <a:fld id="{03EC4E3E-8101-482F-A883-8B55DAFF7C07}" type="datetimeFigureOut">
               <a:rPr lang="en-SG" smtClean="0"/>
-              <a:t>6/7/2018</a:t>
+              <a:t>12/11/18</a:t>
             </a:fld>
             <a:endParaRPr lang="en-SG"/>
           </a:p>
@@ -3351,787 +3347,42 @@
           <a:chExt cx="0" cy="0"/>
         </a:xfrm>
       </p:grpSpPr>
-      <p:sp>
-        <p:nvSpPr>
-          <p:cNvPr id="2" name="TextBox 1">
-            <a:extLst>
-              <a:ext uri="{FF2B5EF4-FFF2-40B4-BE49-F238E27FC236}">
-                <a16:creationId xmlns:a16="http://schemas.microsoft.com/office/drawing/2014/main" id="{032C4FEA-C10B-4133-9BF6-AF6F40CC1AD4}"/>
-              </a:ext>
-            </a:extLst>
-          </p:cNvPr>
-          <p:cNvSpPr txBox="1"/>
+      <p:pic>
+        <p:nvPicPr>
+          <p:cNvPr id="4" name="Picture 3">
+            <a:extLst>
+              <a:ext uri="{FF2B5EF4-FFF2-40B4-BE49-F238E27FC236}">
+                <a16:creationId xmlns:a16="http://schemas.microsoft.com/office/drawing/2014/main" id="{D3F03607-FD69-3943-BF6D-59A30CA84B2D}"/>
+              </a:ext>
+            </a:extLst>
+          </p:cNvPr>
+          <p:cNvPicPr>
+            <a:picLocks noChangeAspect="1"/>
+          </p:cNvPicPr>
           <p:nvPr/>
-        </p:nvSpPr>
+        </p:nvPicPr>
+        <p:blipFill>
+          <a:blip r:embed="rId2">
+            <a:extLst>
+              <a:ext uri="{28A0092B-C50C-407E-A947-70E740481C1C}">
+                <a14:useLocalDpi xmlns:a14="http://schemas.microsoft.com/office/drawing/2010/main" val="0"/>
+              </a:ext>
+            </a:extLst>
+          </a:blip>
+          <a:stretch>
+            <a:fillRect/>
+          </a:stretch>
+        </p:blipFill>
         <p:spPr>
           <a:xfrm>
-            <a:off x="5890055" y="4704348"/>
-            <a:ext cx="5504846" cy="646331"/>
+            <a:off x="1925582" y="608481"/>
+            <a:ext cx="8340835" cy="5641038"/>
           </a:xfrm>
           <a:prstGeom prst="rect">
             <a:avLst/>
           </a:prstGeom>
-          <a:ln>
-            <a:noFill/>
-          </a:ln>
-          <a:effectLst>
-            <a:outerShdw blurRad="63500" sx="102000" sy="102000" algn="ctr" rotWithShape="0">
-              <a:prstClr val="black">
-                <a:alpha val="40000"/>
-              </a:prstClr>
-            </a:outerShdw>
-          </a:effectLst>
         </p:spPr>
-        <p:style>
-          <a:lnRef idx="2">
-            <a:schemeClr val="accent2">
-              <a:shade val="50000"/>
-            </a:schemeClr>
-          </a:lnRef>
-          <a:fillRef idx="1">
-            <a:schemeClr val="accent2"/>
-          </a:fillRef>
-          <a:effectRef idx="0">
-            <a:schemeClr val="accent2"/>
-          </a:effectRef>
-          <a:fontRef idx="minor">
-            <a:schemeClr val="lt1"/>
-          </a:fontRef>
-        </p:style>
-        <p:txBody>
-          <a:bodyPr wrap="square" rtlCol="0">
-            <a:spAutoFit/>
-          </a:bodyPr>
-          <a:lstStyle/>
-          <a:p>
-            <a:pPr algn="ctr"/>
-            <a:r>
-              <a:rPr lang="en-SG" dirty="0"/>
-              <a:t>The state of the address book (before ‘add n/David …’ was executed) will be restored to state ab1.</a:t>
-            </a:r>
-          </a:p>
-        </p:txBody>
-      </p:sp>
-      <p:sp>
-        <p:nvSpPr>
-          <p:cNvPr id="24" name="Down Arrow 23"/>
-          <p:cNvSpPr/>
-          <p:nvPr/>
-        </p:nvSpPr>
-        <p:spPr>
-          <a:xfrm>
-            <a:off x="7512000" y="2116184"/>
-            <a:ext cx="1335908" cy="1558834"/>
-          </a:xfrm>
-          <a:prstGeom prst="downArrow">
-            <a:avLst/>
-          </a:prstGeom>
-        </p:spPr>
-        <p:style>
-          <a:lnRef idx="2">
-            <a:schemeClr val="accent1">
-              <a:shade val="50000"/>
-            </a:schemeClr>
-          </a:lnRef>
-          <a:fillRef idx="1">
-            <a:schemeClr val="accent1"/>
-          </a:fillRef>
-          <a:effectRef idx="0">
-            <a:schemeClr val="accent1"/>
-          </a:effectRef>
-          <a:fontRef idx="minor">
-            <a:schemeClr val="lt1"/>
-          </a:fontRef>
-        </p:style>
-        <p:txBody>
-          <a:bodyPr rtlCol="0" anchor="ctr"/>
-          <a:lstStyle/>
-          <a:p>
-            <a:pPr algn="ctr"/>
-            <a:r>
-              <a:rPr lang="en-SG" dirty="0"/>
-              <a:t>undo </a:t>
-            </a:r>
-            <a:endParaRPr lang="en-US" dirty="0"/>
-          </a:p>
-        </p:txBody>
-      </p:sp>
-      <p:sp>
-        <p:nvSpPr>
-          <p:cNvPr id="17" name="TextBox 16">
-            <a:extLst>
-              <a:ext uri="{FF2B5EF4-FFF2-40B4-BE49-F238E27FC236}">
-                <a16:creationId xmlns:a16="http://schemas.microsoft.com/office/drawing/2014/main" id="{3151A13B-9509-43FA-BFEB-1D9866A00B84}"/>
-              </a:ext>
-            </a:extLst>
-          </p:cNvPr>
-          <p:cNvSpPr txBox="1"/>
-          <p:nvPr/>
-        </p:nvSpPr>
-        <p:spPr>
-          <a:xfrm>
-            <a:off x="3917960" y="2726030"/>
-            <a:ext cx="3207000" cy="369332"/>
-          </a:xfrm>
-          <a:prstGeom prst="rect">
-            <a:avLst/>
-          </a:prstGeom>
-          <a:noFill/>
-        </p:spPr>
-        <p:txBody>
-          <a:bodyPr wrap="square" rtlCol="0">
-            <a:spAutoFit/>
-          </a:bodyPr>
-          <a:lstStyle/>
-          <a:p>
-            <a:pPr algn="ctr"/>
-            <a:r>
-              <a:rPr lang="en-SG" dirty="0" err="1">
-                <a:latin typeface="Consolas" panose="020B0609020204030204" pitchFamily="49" charset="0"/>
-              </a:rPr>
-              <a:t>currentStatePointer</a:t>
-            </a:r>
-            <a:r>
-              <a:rPr lang="en-SG" dirty="0">
-                <a:latin typeface="Consolas" panose="020B0609020204030204" pitchFamily="49" charset="0"/>
-              </a:rPr>
-              <a:t> = 2</a:t>
-            </a:r>
-          </a:p>
-        </p:txBody>
-      </p:sp>
-      <p:graphicFrame>
-        <p:nvGraphicFramePr>
-          <p:cNvPr id="18" name="Table 17">
-            <a:extLst>
-              <a:ext uri="{FF2B5EF4-FFF2-40B4-BE49-F238E27FC236}">
-                <a16:creationId xmlns:a16="http://schemas.microsoft.com/office/drawing/2014/main" id="{F545FAB8-F1CE-4886-9BDE-E772BCB0A9C4}"/>
-              </a:ext>
-            </a:extLst>
-          </p:cNvPr>
-          <p:cNvGraphicFramePr>
-            <a:graphicFrameLocks noGrp="1"/>
-          </p:cNvGraphicFramePr>
-          <p:nvPr>
-            <p:extLst>
-              <p:ext uri="{D42A27DB-BD31-4B8C-83A1-F6EECF244321}">
-                <p14:modId xmlns:p14="http://schemas.microsoft.com/office/powerpoint/2010/main" val="1674993041"/>
-              </p:ext>
-            </p:extLst>
-          </p:nvPr>
-        </p:nvGraphicFramePr>
-        <p:xfrm>
-          <a:off x="473240" y="1476102"/>
-          <a:ext cx="1825824" cy="417888"/>
-        </p:xfrm>
-        <a:graphic>
-          <a:graphicData uri="http://schemas.openxmlformats.org/drawingml/2006/table">
-            <a:tbl>
-              <a:tblPr>
-                <a:tableStyleId>{638B1855-1B75-4FBE-930C-398BA8C253C6}</a:tableStyleId>
-              </a:tblPr>
-              <a:tblGrid>
-                <a:gridCol w="1825824">
-                  <a:extLst>
-                    <a:ext uri="{9D8B030D-6E8A-4147-A177-3AD203B41FA5}">
-                      <a16:colId xmlns:a16="http://schemas.microsoft.com/office/drawing/2014/main" val="4240773277"/>
-                    </a:ext>
-                  </a:extLst>
-                </a:gridCol>
-              </a:tblGrid>
-              <a:tr h="417888">
-                <a:tc>
-                  <a:txBody>
-                    <a:bodyPr/>
-                    <a:lstStyle/>
-                    <a:p>
-                      <a:r>
-                        <a:rPr lang="en-SG" u="sng" dirty="0"/>
-                        <a:t>ab0:</a:t>
-                      </a:r>
-                      <a:r>
-                        <a:rPr lang="en-SG" sz="1800" u="sng" dirty="0"/>
-                        <a:t>AddressBook</a:t>
-                      </a:r>
-                      <a:endParaRPr lang="en-SG" u="sng" dirty="0"/>
-                    </a:p>
-                  </a:txBody>
-                  <a:tcPr/>
-                </a:tc>
-                <a:extLst>
-                  <a:ext uri="{0D108BD9-81ED-4DB2-BD59-A6C34878D82A}">
-                    <a16:rowId xmlns:a16="http://schemas.microsoft.com/office/drawing/2014/main" val="2194462629"/>
-                  </a:ext>
-                </a:extLst>
-              </a:tr>
-            </a:tbl>
-          </a:graphicData>
-        </a:graphic>
-      </p:graphicFrame>
-      <p:sp>
-        <p:nvSpPr>
-          <p:cNvPr id="28" name="Rectangle 27"/>
-          <p:cNvSpPr/>
-          <p:nvPr/>
-        </p:nvSpPr>
-        <p:spPr>
-          <a:xfrm>
-            <a:off x="364797" y="1375953"/>
-            <a:ext cx="11364686" cy="618187"/>
-          </a:xfrm>
-          <a:prstGeom prst="rect">
-            <a:avLst/>
-          </a:prstGeom>
-          <a:noFill/>
-          <a:ln>
-            <a:solidFill>
-              <a:schemeClr val="tx1"/>
-            </a:solidFill>
-          </a:ln>
-        </p:spPr>
-        <p:style>
-          <a:lnRef idx="2">
-            <a:schemeClr val="accent1">
-              <a:shade val="50000"/>
-            </a:schemeClr>
-          </a:lnRef>
-          <a:fillRef idx="1">
-            <a:schemeClr val="accent1"/>
-          </a:fillRef>
-          <a:effectRef idx="0">
-            <a:schemeClr val="accent1"/>
-          </a:effectRef>
-          <a:fontRef idx="minor">
-            <a:schemeClr val="lt1"/>
-          </a:fontRef>
-        </p:style>
-        <p:txBody>
-          <a:bodyPr rtlCol="0" anchor="ctr"/>
-          <a:lstStyle/>
-          <a:p>
-            <a:pPr algn="ctr"/>
-            <a:endParaRPr lang="en-US"/>
-          </a:p>
-        </p:txBody>
-      </p:sp>
-      <p:sp>
-        <p:nvSpPr>
-          <p:cNvPr id="29" name="TextBox 28">
-            <a:extLst>
-              <a:ext uri="{FF2B5EF4-FFF2-40B4-BE49-F238E27FC236}">
-                <a16:creationId xmlns:a16="http://schemas.microsoft.com/office/drawing/2014/main" id="{3151A13B-9509-43FA-BFEB-1D9866A00B84}"/>
-              </a:ext>
-            </a:extLst>
-          </p:cNvPr>
-          <p:cNvSpPr txBox="1"/>
-          <p:nvPr/>
-        </p:nvSpPr>
-        <p:spPr>
-          <a:xfrm>
-            <a:off x="1939992" y="5234888"/>
-            <a:ext cx="3207000" cy="369332"/>
-          </a:xfrm>
-          <a:prstGeom prst="rect">
-            <a:avLst/>
-          </a:prstGeom>
-          <a:noFill/>
-        </p:spPr>
-        <p:txBody>
-          <a:bodyPr wrap="square" rtlCol="0">
-            <a:spAutoFit/>
-          </a:bodyPr>
-          <a:lstStyle/>
-          <a:p>
-            <a:pPr algn="ctr"/>
-            <a:r>
-              <a:rPr lang="en-SG" dirty="0" err="1">
-                <a:latin typeface="Consolas" panose="020B0609020204030204" pitchFamily="49" charset="0"/>
-              </a:rPr>
-              <a:t>currentStatePointer</a:t>
-            </a:r>
-            <a:r>
-              <a:rPr lang="en-SG" dirty="0">
-                <a:latin typeface="Consolas" panose="020B0609020204030204" pitchFamily="49" charset="0"/>
-              </a:rPr>
-              <a:t> = 1</a:t>
-            </a:r>
-          </a:p>
-        </p:txBody>
-      </p:sp>
-      <p:sp>
-        <p:nvSpPr>
-          <p:cNvPr id="38" name="Rectangle 37"/>
-          <p:cNvSpPr/>
-          <p:nvPr/>
-        </p:nvSpPr>
-        <p:spPr>
-          <a:xfrm>
-            <a:off x="387404" y="3838574"/>
-            <a:ext cx="11364686" cy="593918"/>
-          </a:xfrm>
-          <a:prstGeom prst="rect">
-            <a:avLst/>
-          </a:prstGeom>
-          <a:noFill/>
-          <a:ln>
-            <a:solidFill>
-              <a:schemeClr val="tx1"/>
-            </a:solidFill>
-          </a:ln>
-        </p:spPr>
-        <p:style>
-          <a:lnRef idx="2">
-            <a:schemeClr val="accent1">
-              <a:shade val="50000"/>
-            </a:schemeClr>
-          </a:lnRef>
-          <a:fillRef idx="1">
-            <a:schemeClr val="accent1"/>
-          </a:fillRef>
-          <a:effectRef idx="0">
-            <a:schemeClr val="accent1"/>
-          </a:effectRef>
-          <a:fontRef idx="minor">
-            <a:schemeClr val="lt1"/>
-          </a:fontRef>
-        </p:style>
-        <p:txBody>
-          <a:bodyPr rtlCol="0" anchor="ctr"/>
-          <a:lstStyle/>
-          <a:p>
-            <a:pPr algn="ctr"/>
-            <a:endParaRPr lang="en-US"/>
-          </a:p>
-        </p:txBody>
-      </p:sp>
-      <p:graphicFrame>
-        <p:nvGraphicFramePr>
-          <p:cNvPr id="16" name="Table 15">
-            <a:extLst>
-              <a:ext uri="{FF2B5EF4-FFF2-40B4-BE49-F238E27FC236}">
-                <a16:creationId xmlns:a16="http://schemas.microsoft.com/office/drawing/2014/main" id="{F545FAB8-F1CE-4886-9BDE-E772BCB0A9C4}"/>
-              </a:ext>
-            </a:extLst>
-          </p:cNvPr>
-          <p:cNvGraphicFramePr>
-            <a:graphicFrameLocks noGrp="1"/>
-          </p:cNvGraphicFramePr>
-          <p:nvPr>
-            <p:extLst>
-              <p:ext uri="{D42A27DB-BD31-4B8C-83A1-F6EECF244321}">
-                <p14:modId xmlns:p14="http://schemas.microsoft.com/office/powerpoint/2010/main" val="3085921390"/>
-              </p:ext>
-            </p:extLst>
-          </p:nvPr>
-        </p:nvGraphicFramePr>
-        <p:xfrm>
-          <a:off x="2440458" y="1476102"/>
-          <a:ext cx="1825824" cy="417888"/>
-        </p:xfrm>
-        <a:graphic>
-          <a:graphicData uri="http://schemas.openxmlformats.org/drawingml/2006/table">
-            <a:tbl>
-              <a:tblPr>
-                <a:tableStyleId>{638B1855-1B75-4FBE-930C-398BA8C253C6}</a:tableStyleId>
-              </a:tblPr>
-              <a:tblGrid>
-                <a:gridCol w="1825824">
-                  <a:extLst>
-                    <a:ext uri="{9D8B030D-6E8A-4147-A177-3AD203B41FA5}">
-                      <a16:colId xmlns:a16="http://schemas.microsoft.com/office/drawing/2014/main" val="4240773277"/>
-                    </a:ext>
-                  </a:extLst>
-                </a:gridCol>
-              </a:tblGrid>
-              <a:tr h="417888">
-                <a:tc>
-                  <a:txBody>
-                    <a:bodyPr/>
-                    <a:lstStyle/>
-                    <a:p>
-                      <a:r>
-                        <a:rPr lang="en-SG" u="sng" dirty="0"/>
-                        <a:t>ab1:</a:t>
-                      </a:r>
-                      <a:r>
-                        <a:rPr lang="en-SG" sz="1800" u="sng" dirty="0"/>
-                        <a:t>AddressBook</a:t>
-                      </a:r>
-                      <a:endParaRPr lang="en-SG" u="sng" dirty="0"/>
-                    </a:p>
-                  </a:txBody>
-                  <a:tcPr/>
-                </a:tc>
-                <a:extLst>
-                  <a:ext uri="{0D108BD9-81ED-4DB2-BD59-A6C34878D82A}">
-                    <a16:rowId xmlns:a16="http://schemas.microsoft.com/office/drawing/2014/main" val="2194462629"/>
-                  </a:ext>
-                </a:extLst>
-              </a:tr>
-            </a:tbl>
-          </a:graphicData>
-        </a:graphic>
-      </p:graphicFrame>
-      <p:graphicFrame>
-        <p:nvGraphicFramePr>
-          <p:cNvPr id="20" name="Table 19">
-            <a:extLst>
-              <a:ext uri="{FF2B5EF4-FFF2-40B4-BE49-F238E27FC236}">
-                <a16:creationId xmlns:a16="http://schemas.microsoft.com/office/drawing/2014/main" id="{F545FAB8-F1CE-4886-9BDE-E772BCB0A9C4}"/>
-              </a:ext>
-            </a:extLst>
-          </p:cNvPr>
-          <p:cNvGraphicFramePr>
-            <a:graphicFrameLocks noGrp="1"/>
-          </p:cNvGraphicFramePr>
-          <p:nvPr>
-            <p:extLst>
-              <p:ext uri="{D42A27DB-BD31-4B8C-83A1-F6EECF244321}">
-                <p14:modId xmlns:p14="http://schemas.microsoft.com/office/powerpoint/2010/main" val="3504448791"/>
-              </p:ext>
-            </p:extLst>
-          </p:nvPr>
-        </p:nvGraphicFramePr>
-        <p:xfrm>
-          <a:off x="4409785" y="1476102"/>
-          <a:ext cx="1825824" cy="417888"/>
-        </p:xfrm>
-        <a:graphic>
-          <a:graphicData uri="http://schemas.openxmlformats.org/drawingml/2006/table">
-            <a:tbl>
-              <a:tblPr>
-                <a:tableStyleId>{638B1855-1B75-4FBE-930C-398BA8C253C6}</a:tableStyleId>
-              </a:tblPr>
-              <a:tblGrid>
-                <a:gridCol w="1825824">
-                  <a:extLst>
-                    <a:ext uri="{9D8B030D-6E8A-4147-A177-3AD203B41FA5}">
-                      <a16:colId xmlns:a16="http://schemas.microsoft.com/office/drawing/2014/main" val="4240773277"/>
-                    </a:ext>
-                  </a:extLst>
-                </a:gridCol>
-              </a:tblGrid>
-              <a:tr h="417888">
-                <a:tc>
-                  <a:txBody>
-                    <a:bodyPr/>
-                    <a:lstStyle/>
-                    <a:p>
-                      <a:r>
-                        <a:rPr lang="en-SG" u="sng" dirty="0"/>
-                        <a:t>ab2:</a:t>
-                      </a:r>
-                      <a:r>
-                        <a:rPr lang="en-SG" sz="1800" u="sng" dirty="0"/>
-                        <a:t>AddressBook</a:t>
-                      </a:r>
-                      <a:endParaRPr lang="en-SG" u="sng" dirty="0"/>
-                    </a:p>
-                  </a:txBody>
-                  <a:tcPr/>
-                </a:tc>
-                <a:extLst>
-                  <a:ext uri="{0D108BD9-81ED-4DB2-BD59-A6C34878D82A}">
-                    <a16:rowId xmlns:a16="http://schemas.microsoft.com/office/drawing/2014/main" val="2194462629"/>
-                  </a:ext>
-                </a:extLst>
-              </a:tr>
-            </a:tbl>
-          </a:graphicData>
-        </a:graphic>
-      </p:graphicFrame>
-      <p:graphicFrame>
-        <p:nvGraphicFramePr>
-          <p:cNvPr id="21" name="Table 20">
-            <a:extLst>
-              <a:ext uri="{FF2B5EF4-FFF2-40B4-BE49-F238E27FC236}">
-                <a16:creationId xmlns:a16="http://schemas.microsoft.com/office/drawing/2014/main" id="{F545FAB8-F1CE-4886-9BDE-E772BCB0A9C4}"/>
-              </a:ext>
-            </a:extLst>
-          </p:cNvPr>
-          <p:cNvGraphicFramePr>
-            <a:graphicFrameLocks noGrp="1"/>
-          </p:cNvGraphicFramePr>
-          <p:nvPr>
-            <p:extLst>
-              <p:ext uri="{D42A27DB-BD31-4B8C-83A1-F6EECF244321}">
-                <p14:modId xmlns:p14="http://schemas.microsoft.com/office/powerpoint/2010/main" val="3880678430"/>
-              </p:ext>
-            </p:extLst>
-          </p:nvPr>
-        </p:nvGraphicFramePr>
-        <p:xfrm>
-          <a:off x="473240" y="3922133"/>
-          <a:ext cx="1825824" cy="417888"/>
-        </p:xfrm>
-        <a:graphic>
-          <a:graphicData uri="http://schemas.openxmlformats.org/drawingml/2006/table">
-            <a:tbl>
-              <a:tblPr>
-                <a:tableStyleId>{638B1855-1B75-4FBE-930C-398BA8C253C6}</a:tableStyleId>
-              </a:tblPr>
-              <a:tblGrid>
-                <a:gridCol w="1825824">
-                  <a:extLst>
-                    <a:ext uri="{9D8B030D-6E8A-4147-A177-3AD203B41FA5}">
-                      <a16:colId xmlns:a16="http://schemas.microsoft.com/office/drawing/2014/main" val="4240773277"/>
-                    </a:ext>
-                  </a:extLst>
-                </a:gridCol>
-              </a:tblGrid>
-              <a:tr h="417888">
-                <a:tc>
-                  <a:txBody>
-                    <a:bodyPr/>
-                    <a:lstStyle/>
-                    <a:p>
-                      <a:r>
-                        <a:rPr lang="en-SG" u="sng" dirty="0"/>
-                        <a:t>ab0:</a:t>
-                      </a:r>
-                      <a:r>
-                        <a:rPr lang="en-SG" sz="1800" u="sng" dirty="0"/>
-                        <a:t>AddressBook</a:t>
-                      </a:r>
-                      <a:endParaRPr lang="en-SG" u="sng" dirty="0"/>
-                    </a:p>
-                  </a:txBody>
-                  <a:tcPr/>
-                </a:tc>
-                <a:extLst>
-                  <a:ext uri="{0D108BD9-81ED-4DB2-BD59-A6C34878D82A}">
-                    <a16:rowId xmlns:a16="http://schemas.microsoft.com/office/drawing/2014/main" val="2194462629"/>
-                  </a:ext>
-                </a:extLst>
-              </a:tr>
-            </a:tbl>
-          </a:graphicData>
-        </a:graphic>
-      </p:graphicFrame>
-      <p:graphicFrame>
-        <p:nvGraphicFramePr>
-          <p:cNvPr id="22" name="Table 21">
-            <a:extLst>
-              <a:ext uri="{FF2B5EF4-FFF2-40B4-BE49-F238E27FC236}">
-                <a16:creationId xmlns:a16="http://schemas.microsoft.com/office/drawing/2014/main" id="{F545FAB8-F1CE-4886-9BDE-E772BCB0A9C4}"/>
-              </a:ext>
-            </a:extLst>
-          </p:cNvPr>
-          <p:cNvGraphicFramePr>
-            <a:graphicFrameLocks noGrp="1"/>
-          </p:cNvGraphicFramePr>
-          <p:nvPr>
-            <p:extLst>
-              <p:ext uri="{D42A27DB-BD31-4B8C-83A1-F6EECF244321}">
-                <p14:modId xmlns:p14="http://schemas.microsoft.com/office/powerpoint/2010/main" val="719723626"/>
-              </p:ext>
-            </p:extLst>
-          </p:nvPr>
-        </p:nvGraphicFramePr>
-        <p:xfrm>
-          <a:off x="2440458" y="3922133"/>
-          <a:ext cx="1825824" cy="417888"/>
-        </p:xfrm>
-        <a:graphic>
-          <a:graphicData uri="http://schemas.openxmlformats.org/drawingml/2006/table">
-            <a:tbl>
-              <a:tblPr>
-                <a:tableStyleId>{638B1855-1B75-4FBE-930C-398BA8C253C6}</a:tableStyleId>
-              </a:tblPr>
-              <a:tblGrid>
-                <a:gridCol w="1825824">
-                  <a:extLst>
-                    <a:ext uri="{9D8B030D-6E8A-4147-A177-3AD203B41FA5}">
-                      <a16:colId xmlns:a16="http://schemas.microsoft.com/office/drawing/2014/main" val="4240773277"/>
-                    </a:ext>
-                  </a:extLst>
-                </a:gridCol>
-              </a:tblGrid>
-              <a:tr h="417888">
-                <a:tc>
-                  <a:txBody>
-                    <a:bodyPr/>
-                    <a:lstStyle/>
-                    <a:p>
-                      <a:r>
-                        <a:rPr lang="en-SG" u="sng" dirty="0"/>
-                        <a:t>ab1:</a:t>
-                      </a:r>
-                      <a:r>
-                        <a:rPr lang="en-SG" sz="1800" u="sng" dirty="0"/>
-                        <a:t>AddressBook</a:t>
-                      </a:r>
-                      <a:endParaRPr lang="en-SG" u="sng" dirty="0"/>
-                    </a:p>
-                  </a:txBody>
-                  <a:tcPr/>
-                </a:tc>
-                <a:extLst>
-                  <a:ext uri="{0D108BD9-81ED-4DB2-BD59-A6C34878D82A}">
-                    <a16:rowId xmlns:a16="http://schemas.microsoft.com/office/drawing/2014/main" val="2194462629"/>
-                  </a:ext>
-                </a:extLst>
-              </a:tr>
-            </a:tbl>
-          </a:graphicData>
-        </a:graphic>
-      </p:graphicFrame>
-      <p:graphicFrame>
-        <p:nvGraphicFramePr>
-          <p:cNvPr id="23" name="Table 22">
-            <a:extLst>
-              <a:ext uri="{FF2B5EF4-FFF2-40B4-BE49-F238E27FC236}">
-                <a16:creationId xmlns:a16="http://schemas.microsoft.com/office/drawing/2014/main" id="{F545FAB8-F1CE-4886-9BDE-E772BCB0A9C4}"/>
-              </a:ext>
-            </a:extLst>
-          </p:cNvPr>
-          <p:cNvGraphicFramePr>
-            <a:graphicFrameLocks noGrp="1"/>
-          </p:cNvGraphicFramePr>
-          <p:nvPr>
-            <p:extLst>
-              <p:ext uri="{D42A27DB-BD31-4B8C-83A1-F6EECF244321}">
-                <p14:modId xmlns:p14="http://schemas.microsoft.com/office/powerpoint/2010/main" val="3592690620"/>
-              </p:ext>
-            </p:extLst>
-          </p:nvPr>
-        </p:nvGraphicFramePr>
-        <p:xfrm>
-          <a:off x="4409785" y="3922133"/>
-          <a:ext cx="1825824" cy="417888"/>
-        </p:xfrm>
-        <a:graphic>
-          <a:graphicData uri="http://schemas.openxmlformats.org/drawingml/2006/table">
-            <a:tbl>
-              <a:tblPr>
-                <a:tableStyleId>{638B1855-1B75-4FBE-930C-398BA8C253C6}</a:tableStyleId>
-              </a:tblPr>
-              <a:tblGrid>
-                <a:gridCol w="1825824">
-                  <a:extLst>
-                    <a:ext uri="{9D8B030D-6E8A-4147-A177-3AD203B41FA5}">
-                      <a16:colId xmlns:a16="http://schemas.microsoft.com/office/drawing/2014/main" val="4240773277"/>
-                    </a:ext>
-                  </a:extLst>
-                </a:gridCol>
-              </a:tblGrid>
-              <a:tr h="417888">
-                <a:tc>
-                  <a:txBody>
-                    <a:bodyPr/>
-                    <a:lstStyle/>
-                    <a:p>
-                      <a:r>
-                        <a:rPr lang="en-SG" u="sng" dirty="0"/>
-                        <a:t>ab2:</a:t>
-                      </a:r>
-                      <a:r>
-                        <a:rPr lang="en-SG" sz="1800" u="sng" dirty="0"/>
-                        <a:t>AddressBook</a:t>
-                      </a:r>
-                      <a:endParaRPr lang="en-SG" u="sng" dirty="0"/>
-                    </a:p>
-                  </a:txBody>
-                  <a:tcPr/>
-                </a:tc>
-                <a:extLst>
-                  <a:ext uri="{0D108BD9-81ED-4DB2-BD59-A6C34878D82A}">
-                    <a16:rowId xmlns:a16="http://schemas.microsoft.com/office/drawing/2014/main" val="2194462629"/>
-                  </a:ext>
-                </a:extLst>
-              </a:tr>
-            </a:tbl>
-          </a:graphicData>
-        </a:graphic>
-      </p:graphicFrame>
-      <p:cxnSp>
-        <p:nvCxnSpPr>
-          <p:cNvPr id="19" name="Straight Arrow Connector 18">
-            <a:extLst>
-              <a:ext uri="{FF2B5EF4-FFF2-40B4-BE49-F238E27FC236}">
-                <a16:creationId xmlns:a16="http://schemas.microsoft.com/office/drawing/2014/main" id="{DC8F2CFA-FFF8-41BD-B884-8ACDF8C96486}"/>
-              </a:ext>
-            </a:extLst>
-          </p:cNvPr>
-          <p:cNvCxnSpPr>
-            <a:cxnSpLocks/>
-          </p:cNvCxnSpPr>
-          <p:nvPr/>
-        </p:nvCxnSpPr>
-        <p:spPr>
-          <a:xfrm flipV="1">
-            <a:off x="5377343" y="2019157"/>
-            <a:ext cx="0" cy="706873"/>
-          </a:xfrm>
-          <a:prstGeom prst="straightConnector1">
-            <a:avLst/>
-          </a:prstGeom>
-          <a:ln>
-            <a:solidFill>
-              <a:srgbClr val="C00000"/>
-            </a:solidFill>
-            <a:tailEnd type="triangle"/>
-          </a:ln>
-        </p:spPr>
-        <p:style>
-          <a:lnRef idx="1">
-            <a:schemeClr val="accent1"/>
-          </a:lnRef>
-          <a:fillRef idx="0">
-            <a:schemeClr val="accent1"/>
-          </a:fillRef>
-          <a:effectRef idx="0">
-            <a:schemeClr val="accent1"/>
-          </a:effectRef>
-          <a:fontRef idx="minor">
-            <a:schemeClr val="tx1"/>
-          </a:fontRef>
-        </p:style>
-      </p:cxnSp>
-      <p:cxnSp>
-        <p:nvCxnSpPr>
-          <p:cNvPr id="25" name="Straight Arrow Connector 24">
-            <a:extLst>
-              <a:ext uri="{FF2B5EF4-FFF2-40B4-BE49-F238E27FC236}">
-                <a16:creationId xmlns:a16="http://schemas.microsoft.com/office/drawing/2014/main" id="{CC39FF7A-ED45-4697-B75C-01E9C1C55F2A}"/>
-              </a:ext>
-            </a:extLst>
-          </p:cNvPr>
-          <p:cNvCxnSpPr>
-            <a:cxnSpLocks/>
-          </p:cNvCxnSpPr>
-          <p:nvPr/>
-        </p:nvCxnSpPr>
-        <p:spPr>
-          <a:xfrm flipV="1">
-            <a:off x="3380763" y="4504888"/>
-            <a:ext cx="0" cy="730001"/>
-          </a:xfrm>
-          <a:prstGeom prst="straightConnector1">
-            <a:avLst/>
-          </a:prstGeom>
-          <a:ln>
-            <a:solidFill>
-              <a:srgbClr val="C00000"/>
-            </a:solidFill>
-            <a:tailEnd type="triangle"/>
-          </a:ln>
-        </p:spPr>
-        <p:style>
-          <a:lnRef idx="1">
-            <a:schemeClr val="accent1"/>
-          </a:lnRef>
-          <a:fillRef idx="0">
-            <a:schemeClr val="accent1"/>
-          </a:fillRef>
-          <a:effectRef idx="0">
-            <a:schemeClr val="accent1"/>
-          </a:effectRef>
-          <a:fontRef idx="minor">
-            <a:schemeClr val="tx1"/>
-          </a:fontRef>
-        </p:style>
-      </p:cxnSp>
+      </p:pic>
     </p:spTree>
     <p:extLst>
       <p:ext uri="{BB962C8B-B14F-4D97-AF65-F5344CB8AC3E}">

</xml_diff>